<commit_message>
updated project presentation file
</commit_message>
<xml_diff>
--- a/resources/report/project_preview.pptx
+++ b/resources/report/project_preview.pptx
@@ -9,10 +9,9 @@
     <p:sldId id="257" r:id="rId3"/>
     <p:sldId id="265" r:id="rId4"/>
     <p:sldId id="258" r:id="rId5"/>
-    <p:sldId id="259" r:id="rId6"/>
-    <p:sldId id="262" r:id="rId7"/>
-    <p:sldId id="264" r:id="rId8"/>
-    <p:sldId id="266" r:id="rId9"/>
+    <p:sldId id="262" r:id="rId6"/>
+    <p:sldId id="259" r:id="rId7"/>
+    <p:sldId id="266" r:id="rId8"/>
   </p:sldIdLst>
   <p:sldSz cx="12192000" cy="6858000"/>
   <p:notesSz cx="6858000" cy="9144000"/>
@@ -120,9 +119,8 @@
             <p14:sldId id="257"/>
             <p14:sldId id="265"/>
             <p14:sldId id="258"/>
+            <p14:sldId id="262"/>
             <p14:sldId id="259"/>
-            <p14:sldId id="262"/>
-            <p14:sldId id="264"/>
             <p14:sldId id="266"/>
           </p14:sldIdLst>
         </p14:section>
@@ -145,6 +143,222 @@
     </p:extLst>
   </p:cmAuthor>
 </p:cmAuthorLst>
+</file>
+
+<file path=ppt/revisionInfo.xml><?xml version="1.0" encoding="utf-8"?>
+<p1510:revInfo xmlns:a="http://schemas.openxmlformats.org/drawingml/2006/main" xmlns:r="http://schemas.openxmlformats.org/officeDocument/2006/relationships" xmlns:p1510="http://schemas.microsoft.com/office/powerpoint/2015/10/main">
+  <p1510:revLst>
+    <p1510:client id="{12A0E239-D543-4877-BC58-30371122B9E3}" v="2" dt="2020-04-26T18:28:23.785"/>
+    <p1510:client id="{3CE543CD-5BA8-4E9E-98E8-1DFC50626FF4}" v="10" dt="2020-04-26T18:07:30.773"/>
+    <p1510:client id="{88CAAA10-8D94-479E-8426-3FD398FC7CF3}" v="27" dt="2020-04-26T18:29:41.627"/>
+    <p1510:client id="{C4DA4C9D-EE00-4231-A474-B11E67CA5D26}" v="50" dt="2020-04-26T18:11:00.899"/>
+    <p1510:client id="{ED0BB254-7DC9-41F9-BD25-B40B54635C31}" v="31" dt="2020-04-26T18:24:53.021"/>
+  </p1510:revLst>
+</p1510:revInfo>
+</file>
+
+<file path=ppt/changesInfos/changesInfo1.xml><?xml version="1.0" encoding="utf-8"?>
+<pc:chgInfo xmlns:a="http://schemas.openxmlformats.org/drawingml/2006/main" xmlns:r="http://schemas.openxmlformats.org/officeDocument/2006/relationships" xmlns:ac="http://schemas.microsoft.com/office/drawing/2013/main/command" xmlns:pc="http://schemas.microsoft.com/office/powerpoint/2013/main/command">
+  <pc:docChgLst>
+    <pc:chgData name="ΜΙΧΑΗΛΟΥ ΙΩΑΝΝΗΣ" userId="S::up1021026@upatras.gr::282e07dd-7e22-488d-b647-b6bef0688432" providerId="AD" clId="Web-{C4DA4C9D-EE00-4231-A474-B11E67CA5D26}"/>
+    <pc:docChg chg="modSld">
+      <pc:chgData name="ΜΙΧΑΗΛΟΥ ΙΩΑΝΝΗΣ" userId="S::up1021026@upatras.gr::282e07dd-7e22-488d-b647-b6bef0688432" providerId="AD" clId="Web-{C4DA4C9D-EE00-4231-A474-B11E67CA5D26}" dt="2020-04-26T18:11:00.899" v="48" actId="20577"/>
+      <pc:docMkLst>
+        <pc:docMk/>
+      </pc:docMkLst>
+      <pc:sldChg chg="modSp">
+        <pc:chgData name="ΜΙΧΑΗΛΟΥ ΙΩΑΝΝΗΣ" userId="S::up1021026@upatras.gr::282e07dd-7e22-488d-b647-b6bef0688432" providerId="AD" clId="Web-{C4DA4C9D-EE00-4231-A474-B11E67CA5D26}" dt="2020-04-26T18:11:00.899" v="47" actId="20577"/>
+        <pc:sldMkLst>
+          <pc:docMk/>
+          <pc:sldMk cId="4170394135" sldId="259"/>
+        </pc:sldMkLst>
+        <pc:spChg chg="mod">
+          <ac:chgData name="ΜΙΧΑΗΛΟΥ ΙΩΑΝΝΗΣ" userId="S::up1021026@upatras.gr::282e07dd-7e22-488d-b647-b6bef0688432" providerId="AD" clId="Web-{C4DA4C9D-EE00-4231-A474-B11E67CA5D26}" dt="2020-04-26T18:11:00.899" v="47" actId="20577"/>
+          <ac:spMkLst>
+            <pc:docMk/>
+            <pc:sldMk cId="4170394135" sldId="259"/>
+            <ac:spMk id="4" creationId="{88A066E9-6293-0A4B-B085-3A96655B5897}"/>
+          </ac:spMkLst>
+        </pc:spChg>
+      </pc:sldChg>
+      <pc:sldChg chg="modSp">
+        <pc:chgData name="ΜΙΧΑΗΛΟΥ ΙΩΑΝΝΗΣ" userId="S::up1021026@upatras.gr::282e07dd-7e22-488d-b647-b6bef0688432" providerId="AD" clId="Web-{C4DA4C9D-EE00-4231-A474-B11E67CA5D26}" dt="2020-04-26T18:06:28.213" v="34" actId="20577"/>
+        <pc:sldMkLst>
+          <pc:docMk/>
+          <pc:sldMk cId="3919308449" sldId="261"/>
+        </pc:sldMkLst>
+        <pc:spChg chg="mod">
+          <ac:chgData name="ΜΙΧΑΗΛΟΥ ΙΩΑΝΝΗΣ" userId="S::up1021026@upatras.gr::282e07dd-7e22-488d-b647-b6bef0688432" providerId="AD" clId="Web-{C4DA4C9D-EE00-4231-A474-B11E67CA5D26}" dt="2020-04-26T18:06:28.213" v="34" actId="20577"/>
+          <ac:spMkLst>
+            <pc:docMk/>
+            <pc:sldMk cId="3919308449" sldId="261"/>
+            <ac:spMk id="39" creationId="{2DE0E426-830E-4E9F-921C-F01BEFD262B2}"/>
+          </ac:spMkLst>
+        </pc:spChg>
+      </pc:sldChg>
+    </pc:docChg>
+  </pc:docChgLst>
+  <pc:docChgLst>
+    <pc:chgData name="ΜΙΧΑΗΛΟΥ ΙΩΑΝΝΗΣ" userId="S::up1021026@upatras.gr::282e07dd-7e22-488d-b647-b6bef0688432" providerId="AD" clId="Web-{ED0BB254-7DC9-41F9-BD25-B40B54635C31}"/>
+    <pc:docChg chg="modSld">
+      <pc:chgData name="ΜΙΧΑΗΛΟΥ ΙΩΑΝΝΗΣ" userId="S::up1021026@upatras.gr::282e07dd-7e22-488d-b647-b6bef0688432" providerId="AD" clId="Web-{ED0BB254-7DC9-41F9-BD25-B40B54635C31}" dt="2020-04-26T18:24:53.021" v="27" actId="1076"/>
+      <pc:docMkLst>
+        <pc:docMk/>
+      </pc:docMkLst>
+      <pc:sldChg chg="addSp delSp modSp">
+        <pc:chgData name="ΜΙΧΑΗΛΟΥ ΙΩΑΝΝΗΣ" userId="S::up1021026@upatras.gr::282e07dd-7e22-488d-b647-b6bef0688432" providerId="AD" clId="Web-{ED0BB254-7DC9-41F9-BD25-B40B54635C31}" dt="2020-04-26T18:24:53.021" v="27" actId="1076"/>
+        <pc:sldMkLst>
+          <pc:docMk/>
+          <pc:sldMk cId="4170394135" sldId="259"/>
+        </pc:sldMkLst>
+        <pc:spChg chg="mod">
+          <ac:chgData name="ΜΙΧΑΗΛΟΥ ΙΩΑΝΝΗΣ" userId="S::up1021026@upatras.gr::282e07dd-7e22-488d-b647-b6bef0688432" providerId="AD" clId="Web-{ED0BB254-7DC9-41F9-BD25-B40B54635C31}" dt="2020-04-26T18:24:35.709" v="20" actId="20577"/>
+          <ac:spMkLst>
+            <pc:docMk/>
+            <pc:sldMk cId="4170394135" sldId="259"/>
+            <ac:spMk id="4" creationId="{88A066E9-6293-0A4B-B085-3A96655B5897}"/>
+          </ac:spMkLst>
+        </pc:spChg>
+        <pc:picChg chg="add mod">
+          <ac:chgData name="ΜΙΧΑΗΛΟΥ ΙΩΑΝΝΗΣ" userId="S::up1021026@upatras.gr::282e07dd-7e22-488d-b647-b6bef0688432" providerId="AD" clId="Web-{ED0BB254-7DC9-41F9-BD25-B40B54635C31}" dt="2020-04-26T18:24:14.834" v="17" actId="1076"/>
+          <ac:picMkLst>
+            <pc:docMk/>
+            <pc:sldMk cId="4170394135" sldId="259"/>
+            <ac:picMk id="3" creationId="{EE8C14CB-51BD-4D42-B774-58920C070341}"/>
+          </ac:picMkLst>
+        </pc:picChg>
+        <pc:picChg chg="add del mod">
+          <ac:chgData name="ΜΙΧΑΗΛΟΥ ΙΩΑΝΝΗΣ" userId="S::up1021026@upatras.gr::282e07dd-7e22-488d-b647-b6bef0688432" providerId="AD" clId="Web-{ED0BB254-7DC9-41F9-BD25-B40B54635C31}" dt="2020-04-26T18:24:46.303" v="25"/>
+          <ac:picMkLst>
+            <pc:docMk/>
+            <pc:sldMk cId="4170394135" sldId="259"/>
+            <ac:picMk id="6" creationId="{CB1FC347-FE5F-4BAC-AFDC-BBBF6D0116FB}"/>
+          </ac:picMkLst>
+        </pc:picChg>
+        <pc:picChg chg="add mod">
+          <ac:chgData name="ΜΙΧΑΗΛΟΥ ΙΩΑΝΝΗΣ" userId="S::up1021026@upatras.gr::282e07dd-7e22-488d-b647-b6bef0688432" providerId="AD" clId="Web-{ED0BB254-7DC9-41F9-BD25-B40B54635C31}" dt="2020-04-26T18:24:53.021" v="27" actId="1076"/>
+          <ac:picMkLst>
+            <pc:docMk/>
+            <pc:sldMk cId="4170394135" sldId="259"/>
+            <ac:picMk id="7" creationId="{CF0DD6E9-BBF4-4846-9D92-175967D6E46C}"/>
+          </ac:picMkLst>
+        </pc:picChg>
+      </pc:sldChg>
+    </pc:docChg>
+  </pc:docChgLst>
+  <pc:docChgLst>
+    <pc:chgData name="ΚΥΡΙΑΚΟΥ ΝΕΟΠΤΟΛΕΜΟΣ" userId="S::up1050612@upatras.gr::3f85a1b2-e6be-4ca6-b13a-8c78b0cb5a03" providerId="AD" clId="Web-{3CE543CD-5BA8-4E9E-98E8-1DFC50626FF4}"/>
+    <pc:docChg chg="modSld">
+      <pc:chgData name="ΚΥΡΙΑΚΟΥ ΝΕΟΠΤΟΛΕΜΟΣ" userId="S::up1050612@upatras.gr::3f85a1b2-e6be-4ca6-b13a-8c78b0cb5a03" providerId="AD" clId="Web-{3CE543CD-5BA8-4E9E-98E8-1DFC50626FF4}" dt="2020-04-26T18:07:30.773" v="9" actId="20577"/>
+      <pc:docMkLst>
+        <pc:docMk/>
+      </pc:docMkLst>
+      <pc:sldChg chg="modSp">
+        <pc:chgData name="ΚΥΡΙΑΚΟΥ ΝΕΟΠΤΟΛΕΜΟΣ" userId="S::up1050612@upatras.gr::3f85a1b2-e6be-4ca6-b13a-8c78b0cb5a03" providerId="AD" clId="Web-{3CE543CD-5BA8-4E9E-98E8-1DFC50626FF4}" dt="2020-04-26T18:07:30.773" v="8" actId="20577"/>
+        <pc:sldMkLst>
+          <pc:docMk/>
+          <pc:sldMk cId="3919308449" sldId="261"/>
+        </pc:sldMkLst>
+        <pc:spChg chg="mod">
+          <ac:chgData name="ΚΥΡΙΑΚΟΥ ΝΕΟΠΤΟΛΕΜΟΣ" userId="S::up1050612@upatras.gr::3f85a1b2-e6be-4ca6-b13a-8c78b0cb5a03" providerId="AD" clId="Web-{3CE543CD-5BA8-4E9E-98E8-1DFC50626FF4}" dt="2020-04-26T18:07:30.773" v="8" actId="20577"/>
+          <ac:spMkLst>
+            <pc:docMk/>
+            <pc:sldMk cId="3919308449" sldId="261"/>
+            <ac:spMk id="39" creationId="{2DE0E426-830E-4E9F-921C-F01BEFD262B2}"/>
+          </ac:spMkLst>
+        </pc:spChg>
+      </pc:sldChg>
+    </pc:docChg>
+  </pc:docChgLst>
+  <pc:docChgLst>
+    <pc:chgData name="ΚΥΡΙΑΚΟΥ ΝΕΟΠΤΟΛΕΜΟΣ" userId="S::up1050612@upatras.gr::3f85a1b2-e6be-4ca6-b13a-8c78b0cb5a03" providerId="AD" clId="Web-{88CAAA10-8D94-479E-8426-3FD398FC7CF3}"/>
+    <pc:docChg chg="modSld">
+      <pc:chgData name="ΚΥΡΙΑΚΟΥ ΝΕΟΠΤΟΛΕΜΟΣ" userId="S::up1050612@upatras.gr::3f85a1b2-e6be-4ca6-b13a-8c78b0cb5a03" providerId="AD" clId="Web-{88CAAA10-8D94-479E-8426-3FD398FC7CF3}" dt="2020-04-26T18:29:41.627" v="24" actId="1076"/>
+      <pc:docMkLst>
+        <pc:docMk/>
+      </pc:docMkLst>
+      <pc:sldChg chg="addSp modSp">
+        <pc:chgData name="ΚΥΡΙΑΚΟΥ ΝΕΟΠΤΟΛΕΜΟΣ" userId="S::up1050612@upatras.gr::3f85a1b2-e6be-4ca6-b13a-8c78b0cb5a03" providerId="AD" clId="Web-{88CAAA10-8D94-479E-8426-3FD398FC7CF3}" dt="2020-04-26T18:29:41.627" v="24" actId="1076"/>
+        <pc:sldMkLst>
+          <pc:docMk/>
+          <pc:sldMk cId="4170394135" sldId="259"/>
+        </pc:sldMkLst>
+        <pc:spChg chg="mod">
+          <ac:chgData name="ΚΥΡΙΑΚΟΥ ΝΕΟΠΤΟΛΕΜΟΣ" userId="S::up1050612@upatras.gr::3f85a1b2-e6be-4ca6-b13a-8c78b0cb5a03" providerId="AD" clId="Web-{88CAAA10-8D94-479E-8426-3FD398FC7CF3}" dt="2020-04-26T18:28:21.783" v="23" actId="20577"/>
+          <ac:spMkLst>
+            <pc:docMk/>
+            <pc:sldMk cId="4170394135" sldId="259"/>
+            <ac:spMk id="2" creationId="{EFD752D6-F737-4D3E-AEA1-8F11B692ACE6}"/>
+          </ac:spMkLst>
+        </pc:spChg>
+        <pc:spChg chg="mod">
+          <ac:chgData name="ΚΥΡΙΑΚΟΥ ΝΕΟΠΤΟΛΕΜΟΣ" userId="S::up1050612@upatras.gr::3f85a1b2-e6be-4ca6-b13a-8c78b0cb5a03" providerId="AD" clId="Web-{88CAAA10-8D94-479E-8426-3FD398FC7CF3}" dt="2020-04-26T18:27:33.971" v="2" actId="20577"/>
+          <ac:spMkLst>
+            <pc:docMk/>
+            <pc:sldMk cId="4170394135" sldId="259"/>
+            <ac:spMk id="4" creationId="{88A066E9-6293-0A4B-B085-3A96655B5897}"/>
+          </ac:spMkLst>
+        </pc:spChg>
+        <pc:picChg chg="mod">
+          <ac:chgData name="ΚΥΡΙΑΚΟΥ ΝΕΟΠΤΟΛΕΜΟΣ" userId="S::up1050612@upatras.gr::3f85a1b2-e6be-4ca6-b13a-8c78b0cb5a03" providerId="AD" clId="Web-{88CAAA10-8D94-479E-8426-3FD398FC7CF3}" dt="2020-04-26T18:27:51.627" v="8" actId="1076"/>
+          <ac:picMkLst>
+            <pc:docMk/>
+            <pc:sldMk cId="4170394135" sldId="259"/>
+            <ac:picMk id="3" creationId="{EE8C14CB-51BD-4D42-B774-58920C070341}"/>
+          </ac:picMkLst>
+        </pc:picChg>
+        <pc:picChg chg="add mod">
+          <ac:chgData name="ΚΥΡΙΑΚΟΥ ΝΕΟΠΤΟΛΕΜΟΣ" userId="S::up1050612@upatras.gr::3f85a1b2-e6be-4ca6-b13a-8c78b0cb5a03" providerId="AD" clId="Web-{88CAAA10-8D94-479E-8426-3FD398FC7CF3}" dt="2020-04-26T18:27:47.158" v="6" actId="1076"/>
+          <ac:picMkLst>
+            <pc:docMk/>
+            <pc:sldMk cId="4170394135" sldId="259"/>
+            <ac:picMk id="5" creationId="{AE97E7A7-85A2-414D-8920-E76C05E4FD8F}"/>
+          </ac:picMkLst>
+        </pc:picChg>
+        <pc:picChg chg="mod">
+          <ac:chgData name="ΚΥΡΙΑΚΟΥ ΝΕΟΠΤΟΛΕΜΟΣ" userId="S::up1050612@upatras.gr::3f85a1b2-e6be-4ca6-b13a-8c78b0cb5a03" providerId="AD" clId="Web-{88CAAA10-8D94-479E-8426-3FD398FC7CF3}" dt="2020-04-26T18:27:54.924" v="9" actId="1076"/>
+          <ac:picMkLst>
+            <pc:docMk/>
+            <pc:sldMk cId="4170394135" sldId="259"/>
+            <ac:picMk id="7" creationId="{CF0DD6E9-BBF4-4846-9D92-175967D6E46C}"/>
+          </ac:picMkLst>
+        </pc:picChg>
+        <pc:picChg chg="mod">
+          <ac:chgData name="ΚΥΡΙΑΚΟΥ ΝΕΟΠΤΟΛΕΜΟΣ" userId="S::up1050612@upatras.gr::3f85a1b2-e6be-4ca6-b13a-8c78b0cb5a03" providerId="AD" clId="Web-{88CAAA10-8D94-479E-8426-3FD398FC7CF3}" dt="2020-04-26T18:29:41.627" v="24" actId="1076"/>
+          <ac:picMkLst>
+            <pc:docMk/>
+            <pc:sldMk cId="4170394135" sldId="259"/>
+            <ac:picMk id="8" creationId="{2C893E5C-ABCC-4890-821F-682519E88899}"/>
+          </ac:picMkLst>
+        </pc:picChg>
+      </pc:sldChg>
+    </pc:docChg>
+  </pc:docChgLst>
+  <pc:docChgLst>
+    <pc:chgData name="ΜΙΧΑΗΛΟΥ ΙΩΑΝΝΗΣ" userId="S::up1021026@upatras.gr::282e07dd-7e22-488d-b647-b6bef0688432" providerId="AD" clId="Web-{12A0E239-D543-4877-BC58-30371122B9E3}"/>
+    <pc:docChg chg="modSld">
+      <pc:chgData name="ΜΙΧΑΗΛΟΥ ΙΩΑΝΝΗΣ" userId="S::up1021026@upatras.gr::282e07dd-7e22-488d-b647-b6bef0688432" providerId="AD" clId="Web-{12A0E239-D543-4877-BC58-30371122B9E3}" dt="2020-04-26T18:28:23.785" v="1" actId="1076"/>
+      <pc:docMkLst>
+        <pc:docMk/>
+      </pc:docMkLst>
+      <pc:sldChg chg="addSp modSp">
+        <pc:chgData name="ΜΙΧΑΗΛΟΥ ΙΩΑΝΝΗΣ" userId="S::up1021026@upatras.gr::282e07dd-7e22-488d-b647-b6bef0688432" providerId="AD" clId="Web-{12A0E239-D543-4877-BC58-30371122B9E3}" dt="2020-04-26T18:28:23.785" v="1" actId="1076"/>
+        <pc:sldMkLst>
+          <pc:docMk/>
+          <pc:sldMk cId="4170394135" sldId="259"/>
+        </pc:sldMkLst>
+        <pc:picChg chg="add mod">
+          <ac:chgData name="ΜΙΧΑΗΛΟΥ ΙΩΑΝΝΗΣ" userId="S::up1021026@upatras.gr::282e07dd-7e22-488d-b647-b6bef0688432" providerId="AD" clId="Web-{12A0E239-D543-4877-BC58-30371122B9E3}" dt="2020-04-26T18:28:23.785" v="1" actId="1076"/>
+          <ac:picMkLst>
+            <pc:docMk/>
+            <pc:sldMk cId="4170394135" sldId="259"/>
+            <ac:picMk id="8" creationId="{2C893E5C-ABCC-4890-821F-682519E88899}"/>
+          </ac:picMkLst>
+        </pc:picChg>
+      </pc:sldChg>
+    </pc:docChg>
+  </pc:docChgLst>
+</pc:chgInfo>
 </file>
 
 <file path=ppt/slideLayouts/slideLayout1.xml><?xml version="1.0" encoding="utf-8"?>
@@ -642,7 +856,6 @@
               <a:rPr lang="en-US"/>
               <a:t>Click to edit Master title style</a:t>
             </a:r>
-            <a:endParaRPr lang="en-US" dirty="0"/>
           </a:p>
         </p:txBody>
       </p:sp>
@@ -759,7 +972,6 @@
               <a:rPr lang="en-US"/>
               <a:t>Click to edit Master subtitle style</a:t>
             </a:r>
-            <a:endParaRPr lang="en-US" dirty="0"/>
           </a:p>
         </p:txBody>
       </p:sp>
@@ -793,7 +1005,7 @@
           <a:p>
             <a:fld id="{5AAF4D49-4AA4-4999-AB82-D5815C877285}" type="datetimeFigureOut">
               <a:rPr lang="el-GR" smtClean="0"/>
-              <a:t>5/1/2020</a:t>
+              <a:t>12/6/20</a:t>
             </a:fld>
             <a:endParaRPr lang="el-GR"/>
           </a:p>
@@ -1742,7 +1954,6 @@
               <a:rPr lang="en-US"/>
               <a:t>Click to edit Master title style</a:t>
             </a:r>
-            <a:endParaRPr lang="en-US" dirty="0"/>
           </a:p>
         </p:txBody>
       </p:sp>
@@ -1821,7 +2032,6 @@
               <a:rPr lang="en-US"/>
               <a:t>Click icon to add picture</a:t>
             </a:r>
-            <a:endParaRPr lang="en-US" dirty="0"/>
           </a:p>
         </p:txBody>
       </p:sp>
@@ -1913,7 +2123,7 @@
           <a:p>
             <a:fld id="{5AAF4D49-4AA4-4999-AB82-D5815C877285}" type="datetimeFigureOut">
               <a:rPr lang="el-GR" smtClean="0"/>
-              <a:t>5/1/2020</a:t>
+              <a:t>12/6/20</a:t>
             </a:fld>
             <a:endParaRPr lang="el-GR"/>
           </a:p>
@@ -2836,7 +3046,6 @@
               <a:rPr lang="en-US"/>
               <a:t>Click to edit Master title style</a:t>
             </a:r>
-            <a:endParaRPr lang="en-US" dirty="0"/>
           </a:p>
         </p:txBody>
       </p:sp>
@@ -2924,7 +3133,7 @@
           <a:p>
             <a:fld id="{5AAF4D49-4AA4-4999-AB82-D5815C877285}" type="datetimeFigureOut">
               <a:rPr lang="el-GR" smtClean="0"/>
-              <a:t>5/1/2020</a:t>
+              <a:t>12/6/20</a:t>
             </a:fld>
             <a:endParaRPr lang="el-GR"/>
           </a:p>
@@ -3856,7 +4065,7 @@
           <a:p>
             <a:pPr lvl="0"/>
             <a:r>
-              <a:rPr lang="en-US" sz="9600" dirty="0"/>
+              <a:rPr lang="en-US" sz="9600"/>
               <a:t>”</a:t>
             </a:r>
           </a:p>
@@ -3899,7 +4108,7 @@
           <a:p>
             <a:pPr lvl="0"/>
             <a:r>
-              <a:rPr lang="en-US" sz="9600" dirty="0"/>
+              <a:rPr lang="en-US" sz="9600"/>
               <a:t>“</a:t>
             </a:r>
           </a:p>
@@ -3933,7 +4142,6 @@
               <a:rPr lang="en-US"/>
               <a:t>Click to edit Master title style</a:t>
             </a:r>
-            <a:endParaRPr lang="en-US" dirty="0"/>
           </a:p>
         </p:txBody>
       </p:sp>
@@ -4094,7 +4302,7 @@
           <a:p>
             <a:fld id="{5AAF4D49-4AA4-4999-AB82-D5815C877285}" type="datetimeFigureOut">
               <a:rPr lang="el-GR" smtClean="0"/>
-              <a:t>5/1/2020</a:t>
+              <a:t>12/6/20</a:t>
             </a:fld>
             <a:endParaRPr lang="el-GR"/>
           </a:p>
@@ -5017,7 +5225,6 @@
               <a:rPr lang="en-US"/>
               <a:t>Click to edit Master title style</a:t>
             </a:r>
-            <a:endParaRPr lang="en-US" dirty="0"/>
           </a:p>
         </p:txBody>
       </p:sp>
@@ -5155,7 +5362,7 @@
           <a:p>
             <a:fld id="{5AAF4D49-4AA4-4999-AB82-D5815C877285}" type="datetimeFigureOut">
               <a:rPr lang="el-GR" smtClean="0"/>
-              <a:t>5/1/2020</a:t>
+              <a:t>12/6/20</a:t>
             </a:fld>
             <a:endParaRPr lang="el-GR"/>
           </a:p>
@@ -5292,7 +5499,6 @@
               <a:rPr lang="en-US"/>
               <a:t>Click to edit Master title style</a:t>
             </a:r>
-            <a:endParaRPr lang="en-US" dirty="0"/>
           </a:p>
         </p:txBody>
       </p:sp>
@@ -5801,7 +6007,7 @@
           <a:p>
             <a:fld id="{5AAF4D49-4AA4-4999-AB82-D5815C877285}" type="datetimeFigureOut">
               <a:rPr lang="el-GR" smtClean="0"/>
-              <a:t>5/1/2020</a:t>
+              <a:t>12/6/20</a:t>
             </a:fld>
             <a:endParaRPr lang="el-GR"/>
           </a:p>
@@ -5902,7 +6108,6 @@
               <a:rPr lang="en-US"/>
               <a:t>Click to edit Master title style</a:t>
             </a:r>
-            <a:endParaRPr lang="en-US" dirty="0"/>
           </a:p>
         </p:txBody>
       </p:sp>
@@ -6052,7 +6257,6 @@
               <a:rPr lang="en-US"/>
               <a:t>Click icon to add picture</a:t>
             </a:r>
-            <a:endParaRPr lang="en-US" dirty="0"/>
           </a:p>
         </p:txBody>
       </p:sp>
@@ -6269,7 +6473,6 @@
               <a:rPr lang="en-US"/>
               <a:t>Click icon to add picture</a:t>
             </a:r>
-            <a:endParaRPr lang="en-US" dirty="0"/>
           </a:p>
         </p:txBody>
       </p:sp>
@@ -6486,7 +6689,6 @@
               <a:rPr lang="en-US"/>
               <a:t>Click icon to add picture</a:t>
             </a:r>
-            <a:endParaRPr lang="en-US" dirty="0"/>
           </a:p>
         </p:txBody>
       </p:sp>
@@ -6648,7 +6850,7 @@
           <a:p>
             <a:fld id="{5AAF4D49-4AA4-4999-AB82-D5815C877285}" type="datetimeFigureOut">
               <a:rPr lang="el-GR" smtClean="0"/>
-              <a:t>5/1/2020</a:t>
+              <a:t>12/6/20</a:t>
             </a:fld>
             <a:endParaRPr lang="el-GR"/>
           </a:p>
@@ -6750,7 +6952,6 @@
               <a:rPr lang="en-US"/>
               <a:t>Click to edit Master title style</a:t>
             </a:r>
-            <a:endParaRPr lang="en-US" dirty="0"/>
           </a:p>
         </p:txBody>
       </p:sp>
@@ -6802,7 +7003,6 @@
               <a:rPr lang="en-US"/>
               <a:t>Fifth level</a:t>
             </a:r>
-            <a:endParaRPr lang="en-US" dirty="0"/>
           </a:p>
         </p:txBody>
       </p:sp>
@@ -6823,7 +7023,7 @@
           <a:p>
             <a:fld id="{5AAF4D49-4AA4-4999-AB82-D5815C877285}" type="datetimeFigureOut">
               <a:rPr lang="el-GR" smtClean="0"/>
-              <a:t>5/1/2020</a:t>
+              <a:t>12/6/20</a:t>
             </a:fld>
             <a:endParaRPr lang="el-GR"/>
           </a:p>
@@ -7743,7 +7943,6 @@
               <a:rPr lang="en-US"/>
               <a:t>Click to edit Master title style</a:t>
             </a:r>
-            <a:endParaRPr lang="en-US" dirty="0"/>
           </a:p>
         </p:txBody>
       </p:sp>
@@ -7800,7 +7999,6 @@
               <a:rPr lang="en-US"/>
               <a:t>Fifth level</a:t>
             </a:r>
-            <a:endParaRPr lang="en-US" dirty="0"/>
           </a:p>
         </p:txBody>
       </p:sp>
@@ -7821,7 +8019,7 @@
           <a:p>
             <a:fld id="{5AAF4D49-4AA4-4999-AB82-D5815C877285}" type="datetimeFigureOut">
               <a:rPr lang="el-GR" smtClean="0"/>
-              <a:t>5/1/2020</a:t>
+              <a:t>12/6/20</a:t>
             </a:fld>
             <a:endParaRPr lang="el-GR"/>
           </a:p>
@@ -7954,7 +8152,6 @@
               <a:rPr lang="en-US"/>
               <a:t>Click to edit Master title style</a:t>
             </a:r>
-            <a:endParaRPr lang="en-US" dirty="0"/>
           </a:p>
         </p:txBody>
       </p:sp>
@@ -8006,7 +8203,6 @@
               <a:rPr lang="en-US"/>
               <a:t>Fifth level</a:t>
             </a:r>
-            <a:endParaRPr lang="en-US" dirty="0"/>
           </a:p>
         </p:txBody>
       </p:sp>
@@ -8027,7 +8223,7 @@
           <a:p>
             <a:fld id="{5AAF4D49-4AA4-4999-AB82-D5815C877285}" type="datetimeFigureOut">
               <a:rPr lang="el-GR" smtClean="0"/>
-              <a:t>5/1/2020</a:t>
+              <a:t>12/6/20</a:t>
             </a:fld>
             <a:endParaRPr lang="el-GR"/>
           </a:p>
@@ -8951,7 +9147,6 @@
               <a:rPr lang="en-US"/>
               <a:t>Click to edit Master title style</a:t>
             </a:r>
-            <a:endParaRPr lang="en-US" dirty="0"/>
           </a:p>
         </p:txBody>
       </p:sp>
@@ -9089,7 +9284,7 @@
           <a:p>
             <a:fld id="{5AAF4D49-4AA4-4999-AB82-D5815C877285}" type="datetimeFigureOut">
               <a:rPr lang="el-GR" smtClean="0"/>
-              <a:t>5/1/2020</a:t>
+              <a:t>12/6/20</a:t>
             </a:fld>
             <a:endParaRPr lang="el-GR"/>
           </a:p>
@@ -9222,7 +9417,6 @@
               <a:rPr lang="en-US"/>
               <a:t>Click to edit Master title style</a:t>
             </a:r>
-            <a:endParaRPr lang="en-US" dirty="0"/>
           </a:p>
         </p:txBody>
       </p:sp>
@@ -9281,7 +9475,6 @@
               <a:rPr lang="en-US"/>
               <a:t>Fifth level</a:t>
             </a:r>
-            <a:endParaRPr lang="en-US" dirty="0"/>
           </a:p>
         </p:txBody>
       </p:sp>
@@ -9340,7 +9533,6 @@
               <a:rPr lang="en-US"/>
               <a:t>Fifth level</a:t>
             </a:r>
-            <a:endParaRPr lang="en-US" dirty="0"/>
           </a:p>
         </p:txBody>
       </p:sp>
@@ -9361,7 +9553,7 @@
           <a:p>
             <a:fld id="{5AAF4D49-4AA4-4999-AB82-D5815C877285}" type="datetimeFigureOut">
               <a:rPr lang="el-GR" smtClean="0"/>
-              <a:t>5/1/2020</a:t>
+              <a:t>12/6/20</a:t>
             </a:fld>
             <a:endParaRPr lang="el-GR"/>
           </a:p>
@@ -9462,7 +9654,6 @@
               <a:rPr lang="en-US"/>
               <a:t>Click to edit Master title style</a:t>
             </a:r>
-            <a:endParaRPr lang="en-US" dirty="0"/>
           </a:p>
         </p:txBody>
       </p:sp>
@@ -9592,7 +9783,6 @@
               <a:rPr lang="en-US"/>
               <a:t>Fifth level</a:t>
             </a:r>
-            <a:endParaRPr lang="en-US" dirty="0"/>
           </a:p>
         </p:txBody>
       </p:sp>
@@ -9722,7 +9912,6 @@
               <a:rPr lang="en-US"/>
               <a:t>Fifth level</a:t>
             </a:r>
-            <a:endParaRPr lang="en-US" dirty="0"/>
           </a:p>
         </p:txBody>
       </p:sp>
@@ -9743,7 +9932,7 @@
           <a:p>
             <a:fld id="{5AAF4D49-4AA4-4999-AB82-D5815C877285}" type="datetimeFigureOut">
               <a:rPr lang="el-GR" smtClean="0"/>
-              <a:t>5/1/2020</a:t>
+              <a:t>12/6/20</a:t>
             </a:fld>
             <a:endParaRPr lang="el-GR"/>
           </a:p>
@@ -9840,7 +10029,6 @@
               <a:rPr lang="en-US"/>
               <a:t>Click to edit Master title style</a:t>
             </a:r>
-            <a:endParaRPr lang="en-US" dirty="0"/>
           </a:p>
         </p:txBody>
       </p:sp>
@@ -9861,7 +10049,7 @@
           <a:p>
             <a:fld id="{5AAF4D49-4AA4-4999-AB82-D5815C877285}" type="datetimeFigureOut">
               <a:rPr lang="el-GR" smtClean="0"/>
-              <a:t>5/1/2020</a:t>
+              <a:t>12/6/20</a:t>
             </a:fld>
             <a:endParaRPr lang="el-GR"/>
           </a:p>
@@ -9956,7 +10144,7 @@
           <a:p>
             <a:fld id="{5AAF4D49-4AA4-4999-AB82-D5815C877285}" type="datetimeFigureOut">
               <a:rPr lang="el-GR" smtClean="0"/>
-              <a:t>5/1/2020</a:t>
+              <a:t>12/6/20</a:t>
             </a:fld>
             <a:endParaRPr lang="el-GR"/>
           </a:p>
@@ -10916,7 +11104,6 @@
               <a:rPr lang="en-US"/>
               <a:t>Click to edit Master title style</a:t>
             </a:r>
-            <a:endParaRPr lang="en-US" dirty="0"/>
           </a:p>
         </p:txBody>
       </p:sp>
@@ -10975,7 +11162,6 @@
               <a:rPr lang="en-US"/>
               <a:t>Fifth level</a:t>
             </a:r>
-            <a:endParaRPr lang="en-US" dirty="0"/>
           </a:p>
         </p:txBody>
       </p:sp>
@@ -11065,7 +11251,7 @@
           <a:p>
             <a:fld id="{5AAF4D49-4AA4-4999-AB82-D5815C877285}" type="datetimeFigureOut">
               <a:rPr lang="el-GR" smtClean="0"/>
-              <a:t>5/1/2020</a:t>
+              <a:t>12/6/20</a:t>
             </a:fld>
             <a:endParaRPr lang="el-GR"/>
           </a:p>
@@ -12027,7 +12213,6 @@
               <a:rPr lang="en-US"/>
               <a:t>Click to edit Master title style</a:t>
             </a:r>
-            <a:endParaRPr lang="en-US" dirty="0"/>
           </a:p>
         </p:txBody>
       </p:sp>
@@ -12106,7 +12291,6 @@
               <a:rPr lang="en-US"/>
               <a:t>Click icon to add picture</a:t>
             </a:r>
-            <a:endParaRPr lang="en-US" dirty="0"/>
           </a:p>
         </p:txBody>
       </p:sp>
@@ -12198,7 +12382,7 @@
           <a:p>
             <a:fld id="{5AAF4D49-4AA4-4999-AB82-D5815C877285}" type="datetimeFigureOut">
               <a:rPr lang="el-GR" smtClean="0"/>
-              <a:t>5/1/2020</a:t>
+              <a:t>12/6/20</a:t>
             </a:fld>
             <a:endParaRPr lang="el-GR"/>
           </a:p>
@@ -13127,7 +13311,6 @@
               <a:rPr lang="en-US"/>
               <a:t>Click to edit Master title style</a:t>
             </a:r>
-            <a:endParaRPr lang="en-US" dirty="0"/>
           </a:p>
         </p:txBody>
       </p:sp>
@@ -13189,7 +13372,6 @@
               <a:rPr lang="en-US"/>
               <a:t>Fifth level</a:t>
             </a:r>
-            <a:endParaRPr lang="en-US" dirty="0"/>
           </a:p>
         </p:txBody>
       </p:sp>
@@ -13226,7 +13408,7 @@
           <a:p>
             <a:fld id="{5AAF4D49-4AA4-4999-AB82-D5815C877285}" type="datetimeFigureOut">
               <a:rPr lang="el-GR" smtClean="0"/>
-              <a:t>5/1/2020</a:t>
+              <a:t>12/6/20</a:t>
             </a:fld>
             <a:endParaRPr lang="el-GR"/>
           </a:p>
@@ -15854,14 +16036,11 @@
           </a:bodyPr>
           <a:lstStyle/>
           <a:p>
-            <a:r>
-              <a:rPr lang="en-US" dirty="0">
-                <a:solidFill>
-                  <a:srgbClr val="EBEBEB"/>
-                </a:solidFill>
-              </a:rPr>
-              <a:t>ΟΜΑΔΑ 23</a:t>
-            </a:r>
+            <a:endParaRPr lang="en-US">
+              <a:solidFill>
+                <a:srgbClr val="EBEBEB"/>
+              </a:solidFill>
+            </a:endParaRPr>
           </a:p>
         </p:txBody>
       </p:sp>
@@ -15895,15 +16074,30 @@
           <a:p>
             <a:pPr algn="ctr"/>
             <a:r>
-              <a:rPr lang="el-GR" sz="2600" dirty="0"/>
+              <a:rPr lang="el-GR" sz="2600"/>
               <a:t>ΕΦΑΡΜΟΓΗ ΑΝΑΖΗΤΗΣΗΣ ΑΕΡΟΠΟΡΙΚΩΝ ΕΙΣΙΤΗΡΙΩΝ</a:t>
             </a:r>
+            <a:br>
+              <a:rPr lang="en-US" sz="2600"/>
+            </a:br>
+            <a:r>
+              <a:rPr lang="en-US" sz="2600"/>
+              <a:t>-</a:t>
+            </a:r>
+            <a:br>
+              <a:rPr lang="en-US" sz="2600"/>
+            </a:br>
+            <a:r>
+              <a:rPr lang="en-US" sz="2600"/>
+              <a:t>Flight Finder</a:t>
+            </a:r>
+            <a:endParaRPr lang="el-GR" sz="2600"/>
           </a:p>
           <a:p>
-            <a:endParaRPr lang="el-GR" sz="2000" dirty="0"/>
+            <a:endParaRPr lang="el-GR" sz="2000"/>
           </a:p>
           <a:p>
-            <a:endParaRPr lang="el-GR" sz="2000" dirty="0"/>
+            <a:endParaRPr lang="el-GR" sz="2000"/>
           </a:p>
           <a:p>
             <a:pPr>
@@ -15911,8 +16105,8 @@
               <a:buChar char=""/>
             </a:pPr>
             <a:r>
-              <a:rPr lang="el-GR" sz="2000" dirty="0"/>
-              <a:t>ΟΝΟΜΑ: Νεοπτόλεμος Κυριάκου. </a:t>
+              <a:rPr lang="el-GR" sz="2000"/>
+              <a:t> ΟΝΟΜΑ: Νεοπτόλεμος Κυριάκου. </a:t>
             </a:r>
           </a:p>
           <a:p>
@@ -15921,8 +16115,8 @@
               <a:buChar char=""/>
             </a:pPr>
             <a:r>
-              <a:rPr lang="el-GR" sz="2000" dirty="0"/>
-              <a:t>ΑΜ: 1050612</a:t>
+              <a:rPr lang="el-GR" sz="2000"/>
+              <a:t> ΑΜ: 1050612</a:t>
             </a:r>
           </a:p>
           <a:p>
@@ -15930,7 +16124,7 @@
               <a:buFont typeface="Wingdings 3" charset="2"/>
               <a:buChar char=""/>
             </a:pPr>
-            <a:endParaRPr lang="el-GR" sz="2000" dirty="0"/>
+            <a:endParaRPr lang="el-GR" sz="2000"/>
           </a:p>
           <a:p>
             <a:pPr>
@@ -15938,9 +16132,22 @@
               <a:buChar char=""/>
             </a:pPr>
             <a:r>
-              <a:rPr lang="el-GR" sz="2000" dirty="0"/>
-              <a:t>ΟΝΟΜΑ: Πουρνάρας Άγγελος</a:t>
+              <a:rPr lang="el-GR" sz="2000"/>
+              <a:t> ΟΝΟΜΑ: </a:t>
             </a:r>
+            <a:r>
+              <a:rPr lang="el-GR" sz="2000" err="1"/>
+              <a:t>Iωάννης</a:t>
+            </a:r>
+            <a:r>
+              <a:rPr lang="el-GR" sz="2000"/>
+              <a:t> </a:t>
+            </a:r>
+            <a:r>
+              <a:rPr lang="el-GR" sz="2000" err="1"/>
+              <a:t>Μιχαήλου</a:t>
+            </a:r>
+            <a:endParaRPr lang="el-GR" sz="2000"/>
           </a:p>
           <a:p>
             <a:pPr>
@@ -15948,15 +16155,56 @@
               <a:buChar char=""/>
             </a:pPr>
             <a:r>
-              <a:rPr lang="el-GR" sz="2000" dirty="0"/>
-              <a:t>ΑΜ: 1057739</a:t>
+              <a:rPr lang="el-GR" sz="2000"/>
+              <a:t> ΑΜ: 10</a:t>
             </a:r>
+            <a:r>
+              <a:rPr lang="en-US" sz="2000"/>
+              <a:t>21026</a:t>
+            </a:r>
+            <a:endParaRPr lang="el-GR" sz="2000"/>
           </a:p>
           <a:p>
-            <a:endParaRPr lang="en-US" sz="2000" dirty="0"/>
+            <a:endParaRPr lang="en-US" sz="2000"/>
           </a:p>
         </p:txBody>
       </p:sp>
+      <p:pic>
+        <p:nvPicPr>
+          <p:cNvPr id="4" name="Picture 3" descr="A close up of a logo&#10;&#10;Description automatically generated">
+            <a:extLst>
+              <a:ext uri="{FF2B5EF4-FFF2-40B4-BE49-F238E27FC236}">
+                <a16:creationId xmlns:a16="http://schemas.microsoft.com/office/drawing/2014/main" id="{A4296DC5-9A4D-D04A-B2A7-3A7621F05766}"/>
+              </a:ext>
+            </a:extLst>
+          </p:cNvPr>
+          <p:cNvPicPr>
+            <a:picLocks noChangeAspect="1"/>
+          </p:cNvPicPr>
+          <p:nvPr/>
+        </p:nvPicPr>
+        <p:blipFill>
+          <a:blip r:embed="rId3">
+            <a:extLst>
+              <a:ext uri="{28A0092B-C50C-407E-A947-70E740481C1C}">
+                <a14:useLocalDpi xmlns:a14="http://schemas.microsoft.com/office/drawing/2010/main" val="0"/>
+              </a:ext>
+            </a:extLst>
+          </a:blip>
+          <a:stretch>
+            <a:fillRect/>
+          </a:stretch>
+        </p:blipFill>
+        <p:spPr>
+          <a:xfrm>
+            <a:off x="1412488" y="2337871"/>
+            <a:ext cx="2328763" cy="2180119"/>
+          </a:xfrm>
+          <a:prstGeom prst="rect">
+            <a:avLst/>
+          </a:prstGeom>
+        </p:spPr>
+      </p:pic>
     </p:spTree>
     <p:extLst>
       <p:ext uri="{BB962C8B-B14F-4D97-AF65-F5344CB8AC3E}">
@@ -16003,7 +16251,12 @@
             <p:ph type="title"/>
           </p:nvPr>
         </p:nvSpPr>
-        <p:spPr/>
+        <p:spPr>
+          <a:xfrm>
+            <a:off x="1715293" y="963158"/>
+            <a:ext cx="8761413" cy="706964"/>
+          </a:xfrm>
+        </p:spPr>
         <p:txBody>
           <a:bodyPr/>
           <a:lstStyle/>
@@ -16046,15 +16299,15 @@
               <a:buNone/>
             </a:pPr>
             <a:r>
-              <a:rPr lang="el-GR" dirty="0"/>
+              <a:rPr lang="el-GR"/>
               <a:t>Μία εταιρεία που συνεργάζεται με διάφορες αεροπορικές εταιρείες επιδιώκει να δημιουργήσει μία ενιαία εφαρμογή αναζήτησης αεροπορικών εισιτηρίων. Η εφαρμογή θα παρέχει επιλογές αναζήτησης διαθεσιμότητας διαφόρων αεροπορικών εισιτηρίων, με τις τιμές τους αντίστοιχα, καθώς και δυνατότητα κράτησης, τροποποίησης και ακύρωσης εισητηρίων.</a:t>
             </a:r>
             <a:r>
-              <a:rPr lang="en-US" dirty="0"/>
+              <a:rPr lang="en-US"/>
               <a:t> </a:t>
             </a:r>
             <a:r>
-              <a:rPr lang="el-GR" dirty="0"/>
+              <a:rPr lang="el-GR"/>
               <a:t>Θα καλύπτει επίσης τη δυνατότητα ηλεκτρονικής εγγραφής των χρηστών για αποθήκευση και προβολή ιστορικού κρατήσεων. </a:t>
             </a:r>
           </a:p>
@@ -16106,7 +16359,12 @@
             <p:ph type="title"/>
           </p:nvPr>
         </p:nvSpPr>
-        <p:spPr/>
+        <p:spPr>
+          <a:xfrm>
+            <a:off x="1715293" y="984178"/>
+            <a:ext cx="8761413" cy="706964"/>
+          </a:xfrm>
+        </p:spPr>
         <p:txBody>
           <a:bodyPr/>
           <a:lstStyle/>
@@ -16141,59 +16399,63 @@
           <a:lstStyle/>
           <a:p>
             <a:r>
-              <a:rPr lang="el-GR" dirty="0"/>
+              <a:rPr lang="el-GR"/>
               <a:t>Συμβατή σε όλα τα λειτουργικά.</a:t>
             </a:r>
           </a:p>
           <a:p>
             <a:r>
-              <a:rPr lang="el-GR" dirty="0"/>
+              <a:rPr lang="el-GR"/>
               <a:t>Εύκολη και φιλική προς το χρήστη.</a:t>
             </a:r>
           </a:p>
           <a:p>
             <a:r>
-              <a:rPr lang="el-GR" dirty="0"/>
+              <a:rPr lang="el-GR"/>
               <a:t>Αναζήτηση πτήσης (</a:t>
             </a:r>
             <a:r>
-              <a:rPr lang="en-US" dirty="0"/>
-              <a:t>round-trip </a:t>
+              <a:rPr lang="en-US"/>
+              <a:t>roundtrip </a:t>
             </a:r>
             <a:r>
-              <a:rPr lang="el-GR" dirty="0"/>
+              <a:rPr lang="el-GR"/>
               <a:t>ή </a:t>
             </a:r>
             <a:r>
-              <a:rPr lang="en-US" dirty="0"/>
-              <a:t>one-way)</a:t>
+              <a:rPr lang="en-US" err="1"/>
+              <a:t>oneway</a:t>
             </a:r>
             <a:r>
-              <a:rPr lang="el-GR" dirty="0"/>
+              <a:rPr lang="en-US"/>
+              <a:t>)</a:t>
+            </a:r>
+            <a:r>
+              <a:rPr lang="el-GR"/>
               <a:t>.</a:t>
             </a:r>
           </a:p>
           <a:p>
             <a:r>
-              <a:rPr lang="el-GR" dirty="0"/>
+              <a:rPr lang="el-GR"/>
               <a:t>Κράτηση πτήσης.</a:t>
             </a:r>
           </a:p>
           <a:p>
             <a:r>
-              <a:rPr lang="el-GR" dirty="0"/>
+              <a:rPr lang="el-GR"/>
               <a:t>Προβολή κράτησης.</a:t>
             </a:r>
           </a:p>
           <a:p>
             <a:r>
-              <a:rPr lang="el-GR" dirty="0"/>
+              <a:rPr lang="el-GR"/>
               <a:t>Διαχείριση κράτησης.</a:t>
             </a:r>
           </a:p>
           <a:p>
             <a:r>
-              <a:rPr lang="el-GR" dirty="0"/>
+              <a:rPr lang="el-GR"/>
               <a:t>Εγγραφή, σύνδεση και διαχείριση λογαριασμού.</a:t>
             </a:r>
           </a:p>
@@ -16201,7 +16463,7 @@
             <a:pPr marL="0" indent="0">
               <a:buNone/>
             </a:pPr>
-            <a:endParaRPr lang="el-GR" dirty="0"/>
+            <a:endParaRPr lang="el-GR"/>
           </a:p>
         </p:txBody>
       </p:sp>
@@ -16251,54 +16513,450 @@
             <p:ph type="title"/>
           </p:nvPr>
         </p:nvSpPr>
-        <p:spPr/>
+        <p:spPr>
+          <a:xfrm>
+            <a:off x="4145738" y="942137"/>
+            <a:ext cx="3900523" cy="706964"/>
+          </a:xfrm>
+        </p:spPr>
         <p:txBody>
           <a:bodyPr/>
           <a:lstStyle/>
           <a:p>
             <a:pPr algn="ctr"/>
             <a:r>
-              <a:rPr lang="en-US" dirty="0"/>
-              <a:t>ER-DIAGRAM</a:t>
+              <a:rPr lang="el-GR" dirty="0"/>
+              <a:t>ΤΕΧΝΟΛΟΓΙΕΣ</a:t>
             </a:r>
-            <a:endParaRPr lang="el-GR" dirty="0"/>
           </a:p>
         </p:txBody>
       </p:sp>
-      <p:pic>
-        <p:nvPicPr>
-          <p:cNvPr id="14" name="Content Placeholder 13" descr="A picture containing text, map&#10;&#10;Description automatically generated">
+      <p:graphicFrame>
+        <p:nvGraphicFramePr>
+          <p:cNvPr id="5" name="Content Placeholder 4">
             <a:extLst>
               <a:ext uri="{FF2B5EF4-FFF2-40B4-BE49-F238E27FC236}">
-                <a16:creationId xmlns:a16="http://schemas.microsoft.com/office/drawing/2014/main" id="{E498D223-ED16-4191-922F-6A65DAA189D1}"/>
+                <a16:creationId xmlns:a16="http://schemas.microsoft.com/office/drawing/2014/main" id="{39408038-724B-B547-9AF4-2248248AF660}"/>
               </a:ext>
             </a:extLst>
           </p:cNvPr>
-          <p:cNvPicPr>
-            <a:picLocks noGrp="1" noChangeAspect="1"/>
-          </p:cNvPicPr>
+          <p:cNvGraphicFramePr>
+            <a:graphicFrameLocks noGrp="1"/>
+          </p:cNvGraphicFramePr>
           <p:nvPr>
             <p:ph idx="1"/>
+            <p:extLst>
+              <p:ext uri="{D42A27DB-BD31-4B8C-83A1-F6EECF244321}">
+                <p14:modId xmlns:p14="http://schemas.microsoft.com/office/powerpoint/2010/main" val="3382609904"/>
+              </p:ext>
+            </p:extLst>
           </p:nvPr>
-        </p:nvPicPr>
-        <p:blipFill rotWithShape="1">
-          <a:blip r:embed="rId2">
-            <a:extLst>
-              <a:ext uri="{28A0092B-C50C-407E-A947-70E740481C1C}">
-                <a14:useLocalDpi xmlns:a14="http://schemas.microsoft.com/office/drawing/2010/main" val="0"/>
-              </a:ext>
-            </a:extLst>
-          </a:blip>
-          <a:srcRect l="1140" t="12338" r="1740" b="4914"/>
-          <a:stretch/>
-        </p:blipFill>
-        <p:spPr>
-          <a:xfrm>
-            <a:off x="2017442" y="2603500"/>
-            <a:ext cx="7037929" cy="3416300"/>
-          </a:xfrm>
-        </p:spPr>
-      </p:pic>
+        </p:nvGraphicFramePr>
+        <p:xfrm>
+          <a:off x="1715292" y="2529928"/>
+          <a:ext cx="8761414" cy="3886200"/>
+        </p:xfrm>
+        <a:graphic>
+          <a:graphicData uri="http://schemas.openxmlformats.org/drawingml/2006/table">
+            <a:tbl>
+              <a:tblPr firstRow="1" bandRow="1">
+                <a:tableStyleId>{5C22544A-7EE6-4342-B048-85BDC9FD1C3A}</a:tableStyleId>
+              </a:tblPr>
+              <a:tblGrid>
+                <a:gridCol w="3928763">
+                  <a:extLst>
+                    <a:ext uri="{9D8B030D-6E8A-4147-A177-3AD203B41FA5}">
+                      <a16:colId xmlns:a16="http://schemas.microsoft.com/office/drawing/2014/main" val="801594186"/>
+                    </a:ext>
+                  </a:extLst>
+                </a:gridCol>
+                <a:gridCol w="4832651">
+                  <a:extLst>
+                    <a:ext uri="{9D8B030D-6E8A-4147-A177-3AD203B41FA5}">
+                      <a16:colId xmlns:a16="http://schemas.microsoft.com/office/drawing/2014/main" val="2929795138"/>
+                    </a:ext>
+                  </a:extLst>
+                </a:gridCol>
+              </a:tblGrid>
+              <a:tr h="370840">
+                <a:tc>
+                  <a:txBody>
+                    <a:bodyPr/>
+                    <a:lstStyle/>
+                    <a:p>
+                      <a:pPr algn="l"/>
+                      <a:r>
+                        <a:rPr lang="en-GB" b="1">
+                          <a:effectLst/>
+                        </a:rPr>
+                        <a:t>Area</a:t>
+                      </a:r>
+                    </a:p>
+                  </a:txBody>
+                  <a:tcPr marL="123825" marR="123825" marT="57150" marB="57150" anchor="ctr"/>
+                </a:tc>
+                <a:tc>
+                  <a:txBody>
+                    <a:bodyPr/>
+                    <a:lstStyle/>
+                    <a:p>
+                      <a:pPr algn="l"/>
+                      <a:r>
+                        <a:rPr lang="en-GB" b="1">
+                          <a:effectLst/>
+                        </a:rPr>
+                        <a:t>Technology</a:t>
+                      </a:r>
+                    </a:p>
+                  </a:txBody>
+                  <a:tcPr marL="123825" marR="123825" marT="57150" marB="57150" anchor="ctr"/>
+                </a:tc>
+                <a:extLst>
+                  <a:ext uri="{0D108BD9-81ED-4DB2-BD59-A6C34878D82A}">
+                    <a16:rowId xmlns:a16="http://schemas.microsoft.com/office/drawing/2014/main" val="2698117729"/>
+                  </a:ext>
+                </a:extLst>
+              </a:tr>
+              <a:tr h="370840">
+                <a:tc>
+                  <a:txBody>
+                    <a:bodyPr/>
+                    <a:lstStyle/>
+                    <a:p>
+                      <a:r>
+                        <a:rPr lang="en-GB">
+                          <a:effectLst/>
+                        </a:rPr>
+                        <a:t>Frontend</a:t>
+                      </a:r>
+                    </a:p>
+                  </a:txBody>
+                  <a:tcPr marL="123825" marR="123825" marT="57150" marB="57150" anchor="ctr"/>
+                </a:tc>
+                <a:tc>
+                  <a:txBody>
+                    <a:bodyPr/>
+                    <a:lstStyle/>
+                    <a:p>
+                      <a:r>
+                        <a:rPr lang="en-GB">
+                          <a:effectLst/>
+                        </a:rPr>
+                        <a:t>Bootstrap, HTML5, CSS3, Javascript (ES6)</a:t>
+                      </a:r>
+                    </a:p>
+                  </a:txBody>
+                  <a:tcPr marL="123825" marR="123825" marT="57150" marB="57150" anchor="ctr"/>
+                </a:tc>
+                <a:extLst>
+                  <a:ext uri="{0D108BD9-81ED-4DB2-BD59-A6C34878D82A}">
+                    <a16:rowId xmlns:a16="http://schemas.microsoft.com/office/drawing/2014/main" val="2708621132"/>
+                  </a:ext>
+                </a:extLst>
+              </a:tr>
+              <a:tr h="370840">
+                <a:tc>
+                  <a:txBody>
+                    <a:bodyPr/>
+                    <a:lstStyle/>
+                    <a:p>
+                      <a:r>
+                        <a:rPr lang="en-GB">
+                          <a:effectLst/>
+                        </a:rPr>
+                        <a:t>Backend</a:t>
+                      </a:r>
+                    </a:p>
+                  </a:txBody>
+                  <a:tcPr marL="123825" marR="123825" marT="57150" marB="57150" anchor="ctr"/>
+                </a:tc>
+                <a:tc>
+                  <a:txBody>
+                    <a:bodyPr/>
+                    <a:lstStyle/>
+                    <a:p>
+                      <a:r>
+                        <a:rPr lang="en-GB">
+                          <a:effectLst/>
+                        </a:rPr>
+                        <a:t>Node.js, Express.js</a:t>
+                      </a:r>
+                    </a:p>
+                  </a:txBody>
+                  <a:tcPr marL="123825" marR="123825" marT="57150" marB="57150" anchor="ctr"/>
+                </a:tc>
+                <a:extLst>
+                  <a:ext uri="{0D108BD9-81ED-4DB2-BD59-A6C34878D82A}">
+                    <a16:rowId xmlns:a16="http://schemas.microsoft.com/office/drawing/2014/main" val="2481825931"/>
+                  </a:ext>
+                </a:extLst>
+              </a:tr>
+              <a:tr h="370840">
+                <a:tc>
+                  <a:txBody>
+                    <a:bodyPr/>
+                    <a:lstStyle/>
+                    <a:p>
+                      <a:r>
+                        <a:rPr lang="en-GB">
+                          <a:effectLst/>
+                        </a:rPr>
+                        <a:t>In-memory caching/datastore</a:t>
+                      </a:r>
+                    </a:p>
+                  </a:txBody>
+                  <a:tcPr marL="123825" marR="123825" marT="57150" marB="57150" anchor="ctr"/>
+                </a:tc>
+                <a:tc>
+                  <a:txBody>
+                    <a:bodyPr/>
+                    <a:lstStyle/>
+                    <a:p>
+                      <a:r>
+                        <a:rPr lang="en-GB">
+                          <a:effectLst/>
+                        </a:rPr>
+                        <a:t>Redis</a:t>
+                      </a:r>
+                    </a:p>
+                  </a:txBody>
+                  <a:tcPr marL="123825" marR="123825" marT="57150" marB="57150" anchor="ctr"/>
+                </a:tc>
+                <a:extLst>
+                  <a:ext uri="{0D108BD9-81ED-4DB2-BD59-A6C34878D82A}">
+                    <a16:rowId xmlns:a16="http://schemas.microsoft.com/office/drawing/2014/main" val="4179947547"/>
+                  </a:ext>
+                </a:extLst>
+              </a:tr>
+              <a:tr h="370840">
+                <a:tc>
+                  <a:txBody>
+                    <a:bodyPr/>
+                    <a:lstStyle/>
+                    <a:p>
+                      <a:r>
+                        <a:rPr lang="en-GB">
+                          <a:effectLst/>
+                        </a:rPr>
+                        <a:t>Authentication middleware</a:t>
+                      </a:r>
+                    </a:p>
+                  </a:txBody>
+                  <a:tcPr marL="123825" marR="123825" marT="57150" marB="57150" anchor="ctr"/>
+                </a:tc>
+                <a:tc>
+                  <a:txBody>
+                    <a:bodyPr/>
+                    <a:lstStyle/>
+                    <a:p>
+                      <a:r>
+                        <a:rPr lang="en-GB" dirty="0" err="1">
+                          <a:effectLst/>
+                        </a:rPr>
+                        <a:t>Passport.js</a:t>
+                      </a:r>
+                      <a:endParaRPr lang="en-GB" dirty="0">
+                        <a:effectLst/>
+                      </a:endParaRPr>
+                    </a:p>
+                  </a:txBody>
+                  <a:tcPr marL="123825" marR="123825" marT="57150" marB="57150" anchor="ctr"/>
+                </a:tc>
+                <a:extLst>
+                  <a:ext uri="{0D108BD9-81ED-4DB2-BD59-A6C34878D82A}">
+                    <a16:rowId xmlns:a16="http://schemas.microsoft.com/office/drawing/2014/main" val="2463949302"/>
+                  </a:ext>
+                </a:extLst>
+              </a:tr>
+              <a:tr h="370840">
+                <a:tc>
+                  <a:txBody>
+                    <a:bodyPr/>
+                    <a:lstStyle/>
+                    <a:p>
+                      <a:r>
+                        <a:rPr lang="en-GB">
+                          <a:effectLst/>
+                        </a:rPr>
+                        <a:t>Data validation middlware</a:t>
+                      </a:r>
+                    </a:p>
+                  </a:txBody>
+                  <a:tcPr marL="123825" marR="123825" marT="57150" marB="57150" anchor="ctr"/>
+                </a:tc>
+                <a:tc>
+                  <a:txBody>
+                    <a:bodyPr/>
+                    <a:lstStyle/>
+                    <a:p>
+                      <a:r>
+                        <a:rPr lang="en-GB">
+                          <a:effectLst/>
+                        </a:rPr>
+                        <a:t>Express superstruct</a:t>
+                      </a:r>
+                    </a:p>
+                  </a:txBody>
+                  <a:tcPr marL="123825" marR="123825" marT="57150" marB="57150" anchor="ctr"/>
+                </a:tc>
+                <a:extLst>
+                  <a:ext uri="{0D108BD9-81ED-4DB2-BD59-A6C34878D82A}">
+                    <a16:rowId xmlns:a16="http://schemas.microsoft.com/office/drawing/2014/main" val="1026912685"/>
+                  </a:ext>
+                </a:extLst>
+              </a:tr>
+              <a:tr h="370840">
+                <a:tc>
+                  <a:txBody>
+                    <a:bodyPr/>
+                    <a:lstStyle/>
+                    <a:p>
+                      <a:r>
+                        <a:rPr lang="en-GB">
+                          <a:effectLst/>
+                        </a:rPr>
+                        <a:t>Transactional emails</a:t>
+                      </a:r>
+                    </a:p>
+                  </a:txBody>
+                  <a:tcPr marL="123825" marR="123825" marT="57150" marB="57150" anchor="ctr"/>
+                </a:tc>
+                <a:tc>
+                  <a:txBody>
+                    <a:bodyPr/>
+                    <a:lstStyle/>
+                    <a:p>
+                      <a:r>
+                        <a:rPr lang="en-GB">
+                          <a:effectLst/>
+                        </a:rPr>
+                        <a:t>Mailgun</a:t>
+                      </a:r>
+                    </a:p>
+                  </a:txBody>
+                  <a:tcPr marL="123825" marR="123825" marT="57150" marB="57150" anchor="ctr"/>
+                </a:tc>
+                <a:extLst>
+                  <a:ext uri="{0D108BD9-81ED-4DB2-BD59-A6C34878D82A}">
+                    <a16:rowId xmlns:a16="http://schemas.microsoft.com/office/drawing/2014/main" val="1617305698"/>
+                  </a:ext>
+                </a:extLst>
+              </a:tr>
+              <a:tr h="370840">
+                <a:tc>
+                  <a:txBody>
+                    <a:bodyPr/>
+                    <a:lstStyle/>
+                    <a:p>
+                      <a:r>
+                        <a:rPr lang="en-GB">
+                          <a:effectLst/>
+                        </a:rPr>
+                        <a:t>Logger</a:t>
+                      </a:r>
+                    </a:p>
+                  </a:txBody>
+                  <a:tcPr marL="123825" marR="123825" marT="57150" marB="57150" anchor="ctr"/>
+                </a:tc>
+                <a:tc>
+                  <a:txBody>
+                    <a:bodyPr/>
+                    <a:lstStyle/>
+                    <a:p>
+                      <a:r>
+                        <a:rPr lang="en-GB">
+                          <a:effectLst/>
+                        </a:rPr>
+                        <a:t>Morgan + Winston</a:t>
+                      </a:r>
+                    </a:p>
+                  </a:txBody>
+                  <a:tcPr marL="123825" marR="123825" marT="57150" marB="57150" anchor="ctr"/>
+                </a:tc>
+                <a:extLst>
+                  <a:ext uri="{0D108BD9-81ED-4DB2-BD59-A6C34878D82A}">
+                    <a16:rowId xmlns:a16="http://schemas.microsoft.com/office/drawing/2014/main" val="1762511400"/>
+                  </a:ext>
+                </a:extLst>
+              </a:tr>
+              <a:tr h="370840">
+                <a:tc>
+                  <a:txBody>
+                    <a:bodyPr/>
+                    <a:lstStyle/>
+                    <a:p>
+                      <a:r>
+                        <a:rPr lang="en-GB">
+                          <a:effectLst/>
+                        </a:rPr>
+                        <a:t>Database</a:t>
+                      </a:r>
+                    </a:p>
+                  </a:txBody>
+                  <a:tcPr marL="123825" marR="123825" marT="57150" marB="57150" anchor="ctr"/>
+                </a:tc>
+                <a:tc>
+                  <a:txBody>
+                    <a:bodyPr/>
+                    <a:lstStyle/>
+                    <a:p>
+                      <a:r>
+                        <a:rPr lang="en-GB" dirty="0">
+                          <a:effectLst/>
+                        </a:rPr>
+                        <a:t>MySQL</a:t>
+                      </a:r>
+                    </a:p>
+                  </a:txBody>
+                  <a:tcPr marL="123825" marR="123825" marT="57150" marB="57150" anchor="ctr"/>
+                </a:tc>
+                <a:extLst>
+                  <a:ext uri="{0D108BD9-81ED-4DB2-BD59-A6C34878D82A}">
+                    <a16:rowId xmlns:a16="http://schemas.microsoft.com/office/drawing/2014/main" val="877583089"/>
+                  </a:ext>
+                </a:extLst>
+              </a:tr>
+              <a:tr h="370840">
+                <a:tc>
+                  <a:txBody>
+                    <a:bodyPr/>
+                    <a:lstStyle/>
+                    <a:p>
+                      <a:r>
+                        <a:rPr lang="en-GB">
+                          <a:effectLst/>
+                        </a:rPr>
+                        <a:t>Deployment</a:t>
+                      </a:r>
+                    </a:p>
+                  </a:txBody>
+                  <a:tcPr marL="123825" marR="123825" marT="57150" marB="57150" anchor="ctr"/>
+                </a:tc>
+                <a:tc>
+                  <a:txBody>
+                    <a:bodyPr/>
+                    <a:lstStyle/>
+                    <a:p>
+                      <a:r>
+                        <a:rPr lang="en-GB" dirty="0">
+                          <a:effectLst/>
+                        </a:rPr>
+                        <a:t>Local/Remote (Custom server)</a:t>
+                      </a:r>
+                    </a:p>
+                  </a:txBody>
+                  <a:tcPr marL="123825" marR="123825" marT="57150" marB="57150" anchor="ctr"/>
+                </a:tc>
+                <a:extLst>
+                  <a:ext uri="{0D108BD9-81ED-4DB2-BD59-A6C34878D82A}">
+                    <a16:rowId xmlns:a16="http://schemas.microsoft.com/office/drawing/2014/main" val="692568767"/>
+                  </a:ext>
+                </a:extLst>
+              </a:tr>
+            </a:tbl>
+          </a:graphicData>
+        </a:graphic>
+      </p:graphicFrame>
     </p:spTree>
     <p:extLst>
       <p:ext uri="{BB962C8B-B14F-4D97-AF65-F5344CB8AC3E}">
@@ -16334,100 +16992,6 @@
           <p:cNvPr id="2" name="Title 1">
             <a:extLst>
               <a:ext uri="{FF2B5EF4-FFF2-40B4-BE49-F238E27FC236}">
-                <a16:creationId xmlns:a16="http://schemas.microsoft.com/office/drawing/2014/main" id="{EFD752D6-F737-4D3E-AEA1-8F11B692ACE6}"/>
-              </a:ext>
-            </a:extLst>
-          </p:cNvPr>
-          <p:cNvSpPr>
-            <a:spLocks noGrp="1"/>
-          </p:cNvSpPr>
-          <p:nvPr>
-            <p:ph type="title"/>
-          </p:nvPr>
-        </p:nvSpPr>
-        <p:spPr/>
-        <p:txBody>
-          <a:bodyPr/>
-          <a:lstStyle/>
-          <a:p>
-            <a:pPr algn="ctr"/>
-            <a:r>
-              <a:rPr lang="el-GR" dirty="0"/>
-              <a:t>ΣΧΕΣΙΑΚΟ ΣΧΗΜΑ</a:t>
-            </a:r>
-          </a:p>
-        </p:txBody>
-      </p:sp>
-      <p:pic>
-        <p:nvPicPr>
-          <p:cNvPr id="7" name="Content Placeholder 6" descr="A screenshot of text&#10;&#10;Description automatically generated">
-            <a:extLst>
-              <a:ext uri="{FF2B5EF4-FFF2-40B4-BE49-F238E27FC236}">
-                <a16:creationId xmlns:a16="http://schemas.microsoft.com/office/drawing/2014/main" id="{E98A28DA-C021-45D4-A4CD-91D6DAFAD167}"/>
-              </a:ext>
-            </a:extLst>
-          </p:cNvPr>
-          <p:cNvPicPr>
-            <a:picLocks noGrp="1" noChangeAspect="1"/>
-          </p:cNvPicPr>
-          <p:nvPr>
-            <p:ph idx="1"/>
-          </p:nvPr>
-        </p:nvPicPr>
-        <p:blipFill>
-          <a:blip r:embed="rId2">
-            <a:extLst>
-              <a:ext uri="{28A0092B-C50C-407E-A947-70E740481C1C}">
-                <a14:useLocalDpi xmlns:a14="http://schemas.microsoft.com/office/drawing/2010/main" val="0"/>
-              </a:ext>
-            </a:extLst>
-          </a:blip>
-          <a:stretch>
-            <a:fillRect/>
-          </a:stretch>
-        </p:blipFill>
-        <p:spPr>
-          <a:xfrm>
-            <a:off x="1800766" y="2747522"/>
-            <a:ext cx="8590467" cy="3589339"/>
-          </a:xfrm>
-        </p:spPr>
-      </p:pic>
-    </p:spTree>
-    <p:extLst>
-      <p:ext uri="{BB962C8B-B14F-4D97-AF65-F5344CB8AC3E}">
-        <p14:creationId xmlns:p14="http://schemas.microsoft.com/office/powerpoint/2010/main" val="4170394135"/>
-      </p:ext>
-    </p:extLst>
-  </p:cSld>
-  <p:clrMapOvr>
-    <a:masterClrMapping/>
-  </p:clrMapOvr>
-</p:sld>
-</file>
-
-<file path=ppt/slides/slide6.xml><?xml version="1.0" encoding="utf-8"?>
-<p:sld xmlns:a="http://schemas.openxmlformats.org/drawingml/2006/main" xmlns:r="http://schemas.openxmlformats.org/officeDocument/2006/relationships" xmlns:p="http://schemas.openxmlformats.org/presentationml/2006/main">
-  <p:cSld>
-    <p:spTree>
-      <p:nvGrpSpPr>
-        <p:cNvPr id="1" name=""/>
-        <p:cNvGrpSpPr/>
-        <p:nvPr/>
-      </p:nvGrpSpPr>
-      <p:grpSpPr>
-        <a:xfrm>
-          <a:off x="0" y="0"/>
-          <a:ext cx="0" cy="0"/>
-          <a:chOff x="0" y="0"/>
-          <a:chExt cx="0" cy="0"/>
-        </a:xfrm>
-      </p:grpSpPr>
-      <p:sp>
-        <p:nvSpPr>
-          <p:cNvPr id="2" name="Title 1">
-            <a:extLst>
-              <a:ext uri="{FF2B5EF4-FFF2-40B4-BE49-F238E27FC236}">
                 <a16:creationId xmlns:a16="http://schemas.microsoft.com/office/drawing/2014/main" id="{76E23B46-65DF-43B7-B4E3-10BC645F760C}"/>
               </a:ext>
             </a:extLst>
@@ -16439,7 +17003,12 @@
             <p:ph type="title"/>
           </p:nvPr>
         </p:nvSpPr>
-        <p:spPr/>
+        <p:spPr>
+          <a:xfrm>
+            <a:off x="1715293" y="973668"/>
+            <a:ext cx="8761413" cy="706964"/>
+          </a:xfrm>
+        </p:spPr>
         <p:txBody>
           <a:bodyPr/>
           <a:lstStyle/>
@@ -16500,7 +17069,7 @@
 </p:sld>
 </file>
 
-<file path=ppt/slides/slide7.xml><?xml version="1.0" encoding="utf-8"?>
+<file path=ppt/slides/slide6.xml><?xml version="1.0" encoding="utf-8"?>
 <p:sld xmlns:a="http://schemas.openxmlformats.org/drawingml/2006/main" xmlns:r="http://schemas.openxmlformats.org/officeDocument/2006/relationships" xmlns:p="http://schemas.openxmlformats.org/presentationml/2006/main">
   <p:cSld>
     <p:spTree>
@@ -16522,7 +17091,7 @@
           <p:cNvPr id="2" name="Title 1">
             <a:extLst>
               <a:ext uri="{FF2B5EF4-FFF2-40B4-BE49-F238E27FC236}">
-                <a16:creationId xmlns:a16="http://schemas.microsoft.com/office/drawing/2014/main" id="{76037659-6101-4B51-8EA3-708CD01B6A00}"/>
+                <a16:creationId xmlns:a16="http://schemas.microsoft.com/office/drawing/2014/main" id="{EFD752D6-F737-4D3E-AEA1-8F11B692ACE6}"/>
               </a:ext>
             </a:extLst>
           </p:cNvPr>
@@ -16533,7 +17102,12 @@
             <p:ph type="title"/>
           </p:nvPr>
         </p:nvSpPr>
-        <p:spPr/>
+        <p:spPr>
+          <a:xfrm>
+            <a:off x="1715293" y="952647"/>
+            <a:ext cx="8761413" cy="706964"/>
+          </a:xfrm>
+        </p:spPr>
         <p:txBody>
           <a:bodyPr/>
           <a:lstStyle/>
@@ -16541,17 +17115,17 @@
             <a:pPr algn="ctr"/>
             <a:r>
               <a:rPr lang="el-GR" dirty="0"/>
-              <a:t>ΔΟΚΙΜΑΣΤΙΚΗ ΛΕΙΤΟΥΡΓΙΑ	</a:t>
+              <a:t>ΔΟΚΙΜΑΣΤΙΚΗ ΛΕΙΤΟΥΡΓΙΑ</a:t>
             </a:r>
           </a:p>
         </p:txBody>
       </p:sp>
       <p:sp>
         <p:nvSpPr>
-          <p:cNvPr id="3" name="Content Placeholder 2">
+          <p:cNvPr id="4" name="Content Placeholder 3">
             <a:extLst>
               <a:ext uri="{FF2B5EF4-FFF2-40B4-BE49-F238E27FC236}">
-                <a16:creationId xmlns:a16="http://schemas.microsoft.com/office/drawing/2014/main" id="{896A3AD4-B63E-4631-AEB5-9071749F5D07}"/>
+                <a16:creationId xmlns:a16="http://schemas.microsoft.com/office/drawing/2014/main" id="{88A066E9-6293-0A4B-B085-3A96655B5897}"/>
               </a:ext>
             </a:extLst>
           </p:cNvPr>
@@ -16564,13 +17138,13 @@
         </p:nvSpPr>
         <p:spPr>
           <a:xfrm>
-            <a:off x="1715294" y="4127500"/>
-            <a:ext cx="8761412" cy="596900"/>
+            <a:off x="1386774" y="3864741"/>
+            <a:ext cx="9418452" cy="706964"/>
           </a:xfrm>
         </p:spPr>
         <p:txBody>
-          <a:bodyPr>
-            <a:normAutofit/>
+          <a:bodyPr vert="horz" lIns="91440" tIns="45720" rIns="91440" bIns="45720" rtlCol="0" anchor="t">
+            <a:normAutofit lnSpcReduction="10000"/>
           </a:bodyPr>
           <a:lstStyle/>
           <a:p>
@@ -16578,32 +17152,19 @@
               <a:buNone/>
             </a:pPr>
             <a:r>
-              <a:rPr lang="en-US" sz="2600" dirty="0">
-                <a:solidFill>
-                  <a:schemeClr val="tx1"/>
-                </a:solidFill>
-                <a:hlinkClick r:id="rId2">
-                  <a:extLst>
-                    <a:ext uri="{A12FA001-AC4F-418D-AE19-62706E023703}">
-                      <ahyp:hlinkClr xmlns:ahyp="http://schemas.microsoft.com/office/drawing/2018/hyperlinkcolor" val="tx"/>
-                    </a:ext>
-                  </a:extLst>
-                </a:hlinkClick>
+              <a:rPr lang="en-US" sz="4400" dirty="0">
+                <a:hlinkClick r:id="rId2"/>
               </a:rPr>
-              <a:t>http://upflightfinder.live/</a:t>
+              <a:t>Demo site</a:t>
             </a:r>
-            <a:endParaRPr lang="el-GR" sz="2600" dirty="0">
-              <a:solidFill>
-                <a:schemeClr val="tx1"/>
-              </a:solidFill>
-            </a:endParaRPr>
+            <a:endParaRPr lang="en-US" sz="4400" dirty="0"/>
           </a:p>
         </p:txBody>
       </p:sp>
     </p:spTree>
     <p:extLst>
       <p:ext uri="{BB962C8B-B14F-4D97-AF65-F5344CB8AC3E}">
-        <p14:creationId xmlns:p14="http://schemas.microsoft.com/office/powerpoint/2010/main" val="3356108507"/>
+        <p14:creationId xmlns:p14="http://schemas.microsoft.com/office/powerpoint/2010/main" val="4170394135"/>
       </p:ext>
     </p:extLst>
   </p:cSld>
@@ -16613,7 +17174,7 @@
 </p:sld>
 </file>
 
-<file path=ppt/slides/slide8.xml><?xml version="1.0" encoding="utf-8"?>
+<file path=ppt/slides/slide7.xml><?xml version="1.0" encoding="utf-8"?>
 <p:sld xmlns:a="http://schemas.openxmlformats.org/drawingml/2006/main" xmlns:r="http://schemas.openxmlformats.org/officeDocument/2006/relationships" xmlns:p="http://schemas.openxmlformats.org/presentationml/2006/main">
   <p:cSld>
     <p:bg>
@@ -17641,8 +18202,8 @@
         </p:nvSpPr>
         <p:spPr>
           <a:xfrm>
-            <a:off x="572561" y="2539696"/>
-            <a:ext cx="4039653" cy="3898900"/>
+            <a:off x="409589" y="2888946"/>
+            <a:ext cx="4502181" cy="3898900"/>
           </a:xfrm>
         </p:spPr>
         <p:txBody>
@@ -17659,6 +18220,7 @@
                 <a:solidFill>
                   <a:schemeClr val="bg1"/>
                 </a:solidFill>
+                <a:latin typeface="+mj-lt"/>
               </a:rPr>
               <a:t>ΕΥΧΑΡΙΣΤΟΥΜΕ!</a:t>
             </a:r>
@@ -17672,33 +18234,29 @@
                 <a:solidFill>
                   <a:schemeClr val="bg1"/>
                 </a:solidFill>
+                <a:latin typeface="+mj-lt"/>
               </a:rPr>
               <a:t>ΕΡΩΤΗΣΕΙΣ</a:t>
             </a:r>
-            <a:endParaRPr lang="en-US" sz="4000" dirty="0">
+            <a:r>
+              <a:rPr lang="en-US" sz="4000" dirty="0">
+                <a:solidFill>
+                  <a:schemeClr val="bg1"/>
+                </a:solidFill>
+                <a:latin typeface="+mj-lt"/>
+              </a:rPr>
+              <a:t>;</a:t>
+            </a:r>
+          </a:p>
+          <a:p>
+            <a:pPr marL="0" indent="0" algn="ctr">
+              <a:buNone/>
+            </a:pPr>
+            <a:endParaRPr lang="el-GR" sz="4000" dirty="0">
               <a:solidFill>
                 <a:schemeClr val="bg1"/>
               </a:solidFill>
-            </a:endParaRPr>
-          </a:p>
-          <a:p>
-            <a:pPr marL="0" indent="0">
-              <a:buNone/>
-            </a:pPr>
-            <a:endParaRPr lang="en-US" dirty="0">
-              <a:solidFill>
-                <a:schemeClr val="bg1"/>
-              </a:solidFill>
-            </a:endParaRPr>
-          </a:p>
-          <a:p>
-            <a:pPr marL="0" indent="0">
-              <a:buNone/>
-            </a:pPr>
-            <a:endParaRPr lang="el-GR" dirty="0">
-              <a:solidFill>
-                <a:schemeClr val="bg1"/>
-              </a:solidFill>
+              <a:latin typeface="+mj-lt"/>
             </a:endParaRPr>
           </a:p>
         </p:txBody>
@@ -17805,7 +18363,7 @@
     </p:spTree>
     <p:extLst>
       <p:ext uri="{BB962C8B-B14F-4D97-AF65-F5344CB8AC3E}">
-        <p14:creationId xmlns:p14="http://schemas.microsoft.com/office/powerpoint/2010/main" val="3693045319"/>
+        <p14:creationId xmlns:p14="http://schemas.microsoft.com/office/powerpoint/2010/main" val="3416743938"/>
       </p:ext>
     </p:extLst>
   </p:cSld>

</xml_diff>